<commit_message>
Changed documentation, worked on subscenes.
</commit_message>
<xml_diff>
--- a/doc/Reading_the_X3D_Object_Model_with_Python.pptx
+++ b/doc/Reading_the_X3D_Object_Model_with_Python.pptx
@@ -266,7 +266,7 @@
           <a:p>
             <a:fld id="{7029C843-9027-4676-BD72-55554FF0EC43}" type="datetimeFigureOut">
               <a:rPr lang="en-US" smtClean="0"/>
-              <a:t>5/18/2017</a:t>
+              <a:t>5/20/2017</a:t>
             </a:fld>
             <a:endParaRPr lang="en-US"/>
           </a:p>
@@ -434,7 +434,7 @@
           <a:p>
             <a:fld id="{7029C843-9027-4676-BD72-55554FF0EC43}" type="datetimeFigureOut">
               <a:rPr lang="en-US" smtClean="0"/>
-              <a:t>5/18/2017</a:t>
+              <a:t>5/20/2017</a:t>
             </a:fld>
             <a:endParaRPr lang="en-US"/>
           </a:p>
@@ -612,7 +612,7 @@
           <a:p>
             <a:fld id="{7029C843-9027-4676-BD72-55554FF0EC43}" type="datetimeFigureOut">
               <a:rPr lang="en-US" smtClean="0"/>
-              <a:t>5/18/2017</a:t>
+              <a:t>5/20/2017</a:t>
             </a:fld>
             <a:endParaRPr lang="en-US"/>
           </a:p>
@@ -780,7 +780,7 @@
           <a:p>
             <a:fld id="{7029C843-9027-4676-BD72-55554FF0EC43}" type="datetimeFigureOut">
               <a:rPr lang="en-US" smtClean="0"/>
-              <a:t>5/18/2017</a:t>
+              <a:t>5/20/2017</a:t>
             </a:fld>
             <a:endParaRPr lang="en-US"/>
           </a:p>
@@ -1025,7 +1025,7 @@
           <a:p>
             <a:fld id="{7029C843-9027-4676-BD72-55554FF0EC43}" type="datetimeFigureOut">
               <a:rPr lang="en-US" smtClean="0"/>
-              <a:t>5/18/2017</a:t>
+              <a:t>5/20/2017</a:t>
             </a:fld>
             <a:endParaRPr lang="en-US"/>
           </a:p>
@@ -1254,7 +1254,7 @@
           <a:p>
             <a:fld id="{7029C843-9027-4676-BD72-55554FF0EC43}" type="datetimeFigureOut">
               <a:rPr lang="en-US" smtClean="0"/>
-              <a:t>5/18/2017</a:t>
+              <a:t>5/20/2017</a:t>
             </a:fld>
             <a:endParaRPr lang="en-US"/>
           </a:p>
@@ -1618,7 +1618,7 @@
           <a:p>
             <a:fld id="{7029C843-9027-4676-BD72-55554FF0EC43}" type="datetimeFigureOut">
               <a:rPr lang="en-US" smtClean="0"/>
-              <a:t>5/18/2017</a:t>
+              <a:t>5/20/2017</a:t>
             </a:fld>
             <a:endParaRPr lang="en-US"/>
           </a:p>
@@ -1735,7 +1735,7 @@
           <a:p>
             <a:fld id="{7029C843-9027-4676-BD72-55554FF0EC43}" type="datetimeFigureOut">
               <a:rPr lang="en-US" smtClean="0"/>
-              <a:t>5/18/2017</a:t>
+              <a:t>5/20/2017</a:t>
             </a:fld>
             <a:endParaRPr lang="en-US"/>
           </a:p>
@@ -1830,7 +1830,7 @@
           <a:p>
             <a:fld id="{7029C843-9027-4676-BD72-55554FF0EC43}" type="datetimeFigureOut">
               <a:rPr lang="en-US" smtClean="0"/>
-              <a:t>5/18/2017</a:t>
+              <a:t>5/20/2017</a:t>
             </a:fld>
             <a:endParaRPr lang="en-US"/>
           </a:p>
@@ -2105,7 +2105,7 @@
           <a:p>
             <a:fld id="{7029C843-9027-4676-BD72-55554FF0EC43}" type="datetimeFigureOut">
               <a:rPr lang="en-US" smtClean="0"/>
-              <a:t>5/18/2017</a:t>
+              <a:t>5/20/2017</a:t>
             </a:fld>
             <a:endParaRPr lang="en-US"/>
           </a:p>
@@ -2357,7 +2357,7 @@
           <a:p>
             <a:fld id="{7029C843-9027-4676-BD72-55554FF0EC43}" type="datetimeFigureOut">
               <a:rPr lang="en-US" smtClean="0"/>
-              <a:t>5/18/2017</a:t>
+              <a:t>5/20/2017</a:t>
             </a:fld>
             <a:endParaRPr lang="en-US"/>
           </a:p>
@@ -2568,7 +2568,7 @@
           <a:p>
             <a:fld id="{7029C843-9027-4676-BD72-55554FF0EC43}" type="datetimeFigureOut">
               <a:rPr lang="en-US" smtClean="0"/>
-              <a:t>5/18/2017</a:t>
+              <a:t>5/20/2017</a:t>
             </a:fld>
             <a:endParaRPr lang="en-US"/>
           </a:p>
@@ -3264,12 +3264,8 @@
           </a:p>
           <a:p>
             <a:r>
-              <a:rPr lang="en-US"/>
-              <a:t>mapToMethod.</a:t>
-            </a:r>
-            <a:r>
               <a:rPr lang="en-US" dirty="0"/>
-              <a:t>py – generates mapToMethod.js for the X3DJSONLD </a:t>
+              <a:t>mapToMethod.py (parseom.py) – generates mapToMethod.js for the X3DJSONLD </a:t>
             </a:r>
             <a:r>
               <a:rPr lang="en-US" dirty="0" err="1"/>

</xml_diff>